<commit_message>
Cleanups after dry run meeting
</commit_message>
<xml_diff>
--- a/GitInstall.pptx
+++ b/GitInstall.pptx
@@ -5,12 +5,13 @@
     <p:sldMasterId id="2147483648" r:id="rId1"/>
   </p:sldMasterIdLst>
   <p:notesMasterIdLst>
-    <p:notesMasterId r:id="rId5"/>
+    <p:notesMasterId r:id="rId6"/>
   </p:notesMasterIdLst>
   <p:sldIdLst>
     <p:sldId id="256" r:id="rId2"/>
     <p:sldId id="257" r:id="rId3"/>
-    <p:sldId id="258" r:id="rId4"/>
+    <p:sldId id="259" r:id="rId4"/>
+    <p:sldId id="258" r:id="rId5"/>
   </p:sldIdLst>
   <p:sldSz cx="13004800" cy="9753600"/>
   <p:notesSz cx="6858000" cy="9144000"/>
@@ -312,6 +313,11 @@
       </a:defRPr>
     </a:lvl9pPr>
   </p:defaultTextStyle>
+  <p:extLst>
+    <p:ext uri="{EFAFB233-063F-42B5-8137-9DF3F51BA10A}">
+      <p15:sldGuideLst xmlns:p15="http://schemas.microsoft.com/office/powerpoint/2012/main"/>
+    </p:ext>
+  </p:extLst>
 </p:presentation>
 </file>
 
@@ -3141,8 +3147,10 @@
           </a:lstStyle>
           <a:p>
             <a:r>
-              <a:t>Installing Git</a:t>
-            </a:r>
+              <a:rPr lang="en-US" dirty="0"/>
+              <a:t>Workshop Pre-Work</a:t>
+            </a:r>
+            <a:endParaRPr dirty="0"/>
           </a:p>
         </p:txBody>
       </p:sp>
@@ -3192,8 +3200,10 @@
           <a:lstStyle/>
           <a:p>
             <a:r>
-              <a:t>Getting git</a:t>
-            </a:r>
+              <a:rPr lang="en-US" dirty="0"/>
+              <a:t>Workshop Pre-Work</a:t>
+            </a:r>
+            <a:endParaRPr dirty="0"/>
           </a:p>
         </p:txBody>
       </p:sp>
@@ -3217,38 +3227,39 @@
           <a:lstStyle/>
           <a:p>
             <a:r>
-              <a:t>Mac’s have it installed.</a:t>
-            </a:r>
-          </a:p>
-          <a:p>
-            <a:r>
-              <a:t>Windows:</a:t>
-            </a:r>
-          </a:p>
-          <a:p>
-            <a:pPr lvl="1"/>
-            <a:r>
-              <a:rPr u="sng">
+              <a:rPr lang="en-US" dirty="0"/>
+              <a:t>Make sure you have Git installed on your machine.</a:t>
+            </a:r>
+          </a:p>
+          <a:p>
+            <a:pPr lvl="2"/>
+            <a:r>
+              <a:rPr lang="en-US" dirty="0"/>
+              <a:t>Details on following slides.</a:t>
+            </a:r>
+          </a:p>
+          <a:p>
+            <a:r>
+              <a:rPr lang="en-US" dirty="0"/>
+              <a:t>Make sure you have a </a:t>
+            </a:r>
+            <a:r>
+              <a:rPr lang="en-US" dirty="0" err="1"/>
+              <a:t>Github</a:t>
+            </a:r>
+            <a:r>
+              <a:rPr lang="en-US" dirty="0"/>
+              <a:t> account.  If you don’t you can create one here: </a:t>
+            </a:r>
+            <a:r>
+              <a:rPr lang="en-US" dirty="0">
                 <a:hlinkClick r:id="rId2"/>
               </a:rPr>
-              <a:t>https://git-scm.com/download/win</a:t>
-            </a:r>
-          </a:p>
-          <a:p>
-            <a:r>
-              <a:t>Linux</a:t>
-            </a:r>
-          </a:p>
-          <a:p>
-            <a:pPr lvl="1"/>
-            <a:r>
-              <a:t>Use Package Manager</a:t>
-            </a:r>
-          </a:p>
-          <a:p>
-            <a:pPr lvl="1"/>
-            <a:r>
-              <a:t>Ubuntu:  $ sudo apt install git</a:t>
+              <a:t>https://github.com/signup</a:t>
+            </a:r>
+            <a:r>
+              <a:rPr lang="en-US" dirty="0"/>
+              <a:t> .</a:t>
             </a:r>
           </a:p>
         </p:txBody>
@@ -3263,6 +3274,154 @@
 </file>
 
 <file path=ppt/slides/slide3.xml><?xml version="1.0" encoding="utf-8"?>
+<p:sld xmlns:a="http://schemas.openxmlformats.org/drawingml/2006/main" xmlns:r="http://schemas.openxmlformats.org/officeDocument/2006/relationships" xmlns:p="http://schemas.openxmlformats.org/presentationml/2006/main">
+  <p:cSld>
+    <p:spTree>
+      <p:nvGrpSpPr>
+        <p:cNvPr id="1" name="">
+          <a:extLst>
+            <a:ext uri="{FF2B5EF4-FFF2-40B4-BE49-F238E27FC236}">
+              <a16:creationId xmlns:a16="http://schemas.microsoft.com/office/drawing/2014/main" id="{57CF5671-D1A2-56BA-3C99-FEA3D0F4C5EA}"/>
+            </a:ext>
+          </a:extLst>
+        </p:cNvPr>
+        <p:cNvGrpSpPr/>
+        <p:nvPr/>
+      </p:nvGrpSpPr>
+      <p:grpSpPr>
+        <a:xfrm>
+          <a:off x="0" y="0"/>
+          <a:ext cx="0" cy="0"/>
+          <a:chOff x="0" y="0"/>
+          <a:chExt cx="0" cy="0"/>
+        </a:xfrm>
+      </p:grpSpPr>
+      <p:sp>
+        <p:nvSpPr>
+          <p:cNvPr id="123" name="Getting git">
+            <a:extLst>
+              <a:ext uri="{FF2B5EF4-FFF2-40B4-BE49-F238E27FC236}">
+                <a16:creationId xmlns:a16="http://schemas.microsoft.com/office/drawing/2014/main" id="{6C814FB9-74E5-4184-D636-B62F0B22698F}"/>
+              </a:ext>
+            </a:extLst>
+          </p:cNvPr>
+          <p:cNvSpPr txBox="1">
+            <a:spLocks noGrp="1"/>
+          </p:cNvSpPr>
+          <p:nvPr>
+            <p:ph type="title"/>
+          </p:nvPr>
+        </p:nvSpPr>
+        <p:spPr>
+          <a:prstGeom prst="rect">
+            <a:avLst/>
+          </a:prstGeom>
+        </p:spPr>
+        <p:txBody>
+          <a:bodyPr/>
+          <a:lstStyle/>
+          <a:p>
+            <a:r>
+              <a:t>Getting git</a:t>
+            </a:r>
+          </a:p>
+        </p:txBody>
+      </p:sp>
+      <p:sp>
+        <p:nvSpPr>
+          <p:cNvPr id="124" name="Mac’s have it installed.…">
+            <a:extLst>
+              <a:ext uri="{FF2B5EF4-FFF2-40B4-BE49-F238E27FC236}">
+                <a16:creationId xmlns:a16="http://schemas.microsoft.com/office/drawing/2014/main" id="{3C78E2B7-DC21-0AC1-8D6A-659ED85C3D13}"/>
+              </a:ext>
+            </a:extLst>
+          </p:cNvPr>
+          <p:cNvSpPr txBox="1">
+            <a:spLocks noGrp="1"/>
+          </p:cNvSpPr>
+          <p:nvPr>
+            <p:ph type="body" idx="1"/>
+          </p:nvPr>
+        </p:nvSpPr>
+        <p:spPr>
+          <a:prstGeom prst="rect">
+            <a:avLst/>
+          </a:prstGeom>
+        </p:spPr>
+        <p:txBody>
+          <a:bodyPr/>
+          <a:lstStyle/>
+          <a:p>
+            <a:r>
+              <a:rPr dirty="0"/>
+              <a:t>Mac’s have it installed.</a:t>
+            </a:r>
+          </a:p>
+          <a:p>
+            <a:r>
+              <a:rPr dirty="0"/>
+              <a:t>Windows:</a:t>
+            </a:r>
+          </a:p>
+          <a:p>
+            <a:pPr lvl="1"/>
+            <a:r>
+              <a:rPr u="sng" dirty="0">
+                <a:hlinkClick r:id="rId2"/>
+              </a:rPr>
+              <a:t>https://git-scm.com/download/win</a:t>
+            </a:r>
+          </a:p>
+          <a:p>
+            <a:r>
+              <a:rPr dirty="0"/>
+              <a:t>Linux</a:t>
+            </a:r>
+          </a:p>
+          <a:p>
+            <a:pPr lvl="1"/>
+            <a:r>
+              <a:rPr dirty="0"/>
+              <a:t>Use Package Manager</a:t>
+            </a:r>
+            <a:r>
+              <a:rPr lang="en-US" dirty="0"/>
+              <a:t> for your distro.</a:t>
+            </a:r>
+            <a:endParaRPr dirty="0"/>
+          </a:p>
+          <a:p>
+            <a:pPr lvl="1"/>
+            <a:r>
+              <a:rPr dirty="0"/>
+              <a:t>Ubuntu:  $ </a:t>
+            </a:r>
+            <a:r>
+              <a:rPr dirty="0" err="1"/>
+              <a:t>sudo</a:t>
+            </a:r>
+            <a:r>
+              <a:rPr dirty="0"/>
+              <a:t> apt install git</a:t>
+            </a:r>
+          </a:p>
+        </p:txBody>
+      </p:sp>
+    </p:spTree>
+    <p:extLst>
+      <p:ext uri="{BB962C8B-B14F-4D97-AF65-F5344CB8AC3E}">
+        <p14:creationId xmlns:p14="http://schemas.microsoft.com/office/powerpoint/2010/main" val="180960101"/>
+      </p:ext>
+    </p:extLst>
+  </p:cSld>
+  <p:clrMapOvr>
+    <a:masterClrMapping/>
+  </p:clrMapOvr>
+  <p:transition spd="med"/>
+</p:sld>
+</file>
+
+<file path=ppt/slides/slide4.xml><?xml version="1.0" encoding="utf-8"?>
 <p:sld xmlns:a="http://schemas.openxmlformats.org/drawingml/2006/main" xmlns:r="http://schemas.openxmlformats.org/officeDocument/2006/relationships" xmlns:p="http://schemas.openxmlformats.org/presentationml/2006/main">
   <p:cSld>
     <p:spTree>

</xml_diff>